<commit_message>
Minor updates to notes, added presentation on Web Services
Minor updates to notes, added presentation on Web Services
</commit_message>
<xml_diff>
--- a/CSharpProgramming/Presentations/Persistency.pptx
+++ b/CSharpProgramming/Presentations/Persistency.pptx
@@ -17,7 +17,10 @@
     <p:sldId id="339" r:id="rId11"/>
     <p:sldId id="337" r:id="rId12"/>
     <p:sldId id="340" r:id="rId13"/>
-    <p:sldId id="326" r:id="rId14"/>
+    <p:sldId id="344" r:id="rId14"/>
+    <p:sldId id="345" r:id="rId15"/>
+    <p:sldId id="346" r:id="rId16"/>
+    <p:sldId id="347" r:id="rId17"/>
   </p:sldIdLst>
   <p:sldSz cx="12192000" cy="6858000"/>
   <p:notesSz cx="6858000" cy="9144000"/>
@@ -3217,11 +3220,11 @@
   <p:clrMapOvr>
     <a:masterClrMapping/>
   </p:clrMapOvr>
-  <mc:AlternateContent xmlns:mc="http://schemas.openxmlformats.org/markup-compatibility/2006">
-    <mc:Choice xmlns:p14="http://schemas.microsoft.com/office/powerpoint/2010/main" Requires="p14">
+  <mc:AlternateContent xmlns:mc="http://schemas.openxmlformats.org/markup-compatibility/2006" xmlns:p14="http://schemas.microsoft.com/office/powerpoint/2010/main">
+    <mc:Choice Requires="p14">
       <p:transition p14:dur="0"/>
     </mc:Choice>
-    <mc:Fallback>
+    <mc:Fallback xmlns="">
       <p:transition/>
     </mc:Fallback>
   </mc:AlternateContent>
@@ -3786,84 +3789,1855 @@
       </p:grpSpPr>
       <p:sp>
         <p:nvSpPr>
-          <p:cNvPr id="29" name="Tekstfelt 28"/>
-          <p:cNvSpPr txBox="1"/>
-          <p:nvPr/>
-        </p:nvSpPr>
-        <p:spPr>
-          <a:xfrm>
-            <a:off x="1110827" y="480595"/>
-            <a:ext cx="10458025" cy="1323439"/>
+          <p:cNvPr id="9" name="Afrundet rektangel 8"/>
+          <p:cNvSpPr/>
+          <p:nvPr/>
+        </p:nvSpPr>
+        <p:spPr>
+          <a:xfrm>
+            <a:off x="6346658" y="134352"/>
+            <a:ext cx="5528509" cy="6519111"/>
+          </a:xfrm>
+          <a:prstGeom prst="roundRect">
+            <a:avLst/>
+          </a:prstGeom>
+          <a:solidFill>
+            <a:schemeClr val="bg1">
+              <a:lumMod val="50000"/>
+            </a:schemeClr>
+          </a:solidFill>
+          <a:ln>
+            <a:solidFill>
+              <a:schemeClr val="bg1">
+                <a:lumMod val="50000"/>
+              </a:schemeClr>
+            </a:solidFill>
+          </a:ln>
+        </p:spPr>
+        <p:style>
+          <a:lnRef idx="2">
+            <a:schemeClr val="accent1">
+              <a:shade val="50000"/>
+            </a:schemeClr>
+          </a:lnRef>
+          <a:fillRef idx="1">
+            <a:schemeClr val="accent1"/>
+          </a:fillRef>
+          <a:effectRef idx="0">
+            <a:schemeClr val="accent1"/>
+          </a:effectRef>
+          <a:fontRef idx="minor">
+            <a:schemeClr val="lt1"/>
+          </a:fontRef>
+        </p:style>
+        <p:txBody>
+          <a:bodyPr rtlCol="0" anchor="ctr"/>
+          <a:lstStyle/>
+          <a:p>
+            <a:r>
+              <a:rPr lang="da-DK" sz="3200" smtClean="0">
+                <a:solidFill>
+                  <a:srgbClr val="FFFF00"/>
+                </a:solidFill>
+              </a:rPr>
+              <a:t>Local</a:t>
+            </a:r>
+            <a:endParaRPr lang="da-DK" sz="3200">
+              <a:solidFill>
+                <a:srgbClr val="FFFF00"/>
+              </a:solidFill>
+            </a:endParaRPr>
+          </a:p>
+        </p:txBody>
+      </p:sp>
+      <p:sp>
+        <p:nvSpPr>
+          <p:cNvPr id="8" name="Afrundet rektangel 7"/>
+          <p:cNvSpPr/>
+          <p:nvPr/>
+        </p:nvSpPr>
+        <p:spPr>
+          <a:xfrm>
+            <a:off x="1124953" y="210552"/>
+            <a:ext cx="2045368" cy="1395663"/>
+          </a:xfrm>
+          <a:prstGeom prst="roundRect">
+            <a:avLst/>
+          </a:prstGeom>
+        </p:spPr>
+        <p:style>
+          <a:lnRef idx="2">
+            <a:schemeClr val="accent1">
+              <a:shade val="50000"/>
+            </a:schemeClr>
+          </a:lnRef>
+          <a:fillRef idx="1">
+            <a:schemeClr val="accent1"/>
+          </a:fillRef>
+          <a:effectRef idx="0">
+            <a:schemeClr val="accent1"/>
+          </a:effectRef>
+          <a:fontRef idx="minor">
+            <a:schemeClr val="lt1"/>
+          </a:fontRef>
+        </p:style>
+        <p:txBody>
+          <a:bodyPr rtlCol="0" anchor="ctr"/>
+          <a:lstStyle/>
+          <a:p>
+            <a:pPr algn="ctr"/>
+            <a:r>
+              <a:rPr lang="da-DK" sz="3600" smtClean="0"/>
+              <a:t>App</a:t>
+            </a:r>
+          </a:p>
+          <a:p>
+            <a:pPr algn="ctr"/>
+            <a:r>
+              <a:rPr lang="da-DK" sz="2400" smtClean="0"/>
+              <a:t>(Console)</a:t>
+            </a:r>
+            <a:endParaRPr lang="da-DK" sz="2400"/>
+          </a:p>
+        </p:txBody>
+      </p:sp>
+      <p:sp>
+        <p:nvSpPr>
+          <p:cNvPr id="11" name="Afrundet rektangel 10"/>
+          <p:cNvSpPr/>
+          <p:nvPr/>
+        </p:nvSpPr>
+        <p:spPr>
+          <a:xfrm>
+            <a:off x="8079204" y="235875"/>
+            <a:ext cx="3031958" cy="1395663"/>
+          </a:xfrm>
+          <a:prstGeom prst="roundRect">
+            <a:avLst/>
+          </a:prstGeom>
+          <a:solidFill>
+            <a:schemeClr val="accent5">
+              <a:lumMod val="75000"/>
+            </a:schemeClr>
+          </a:solidFill>
+        </p:spPr>
+        <p:style>
+          <a:lnRef idx="2">
+            <a:schemeClr val="accent1">
+              <a:shade val="50000"/>
+            </a:schemeClr>
+          </a:lnRef>
+          <a:fillRef idx="1">
+            <a:schemeClr val="accent1"/>
+          </a:fillRef>
+          <a:effectRef idx="0">
+            <a:schemeClr val="accent1"/>
+          </a:effectRef>
+          <a:fontRef idx="minor">
+            <a:schemeClr val="lt1"/>
+          </a:fontRef>
+        </p:style>
+        <p:txBody>
+          <a:bodyPr rtlCol="0" anchor="ctr"/>
+          <a:lstStyle/>
+          <a:p>
+            <a:pPr algn="ctr"/>
+            <a:r>
+              <a:rPr lang="da-DK" sz="3600" smtClean="0"/>
+              <a:t>Entity Framework</a:t>
+            </a:r>
+          </a:p>
+        </p:txBody>
+      </p:sp>
+      <p:sp>
+        <p:nvSpPr>
+          <p:cNvPr id="6" name="Højre-venstrepil 5"/>
+          <p:cNvSpPr/>
+          <p:nvPr/>
+        </p:nvSpPr>
+        <p:spPr>
+          <a:xfrm>
+            <a:off x="3001879" y="475245"/>
+            <a:ext cx="5263816" cy="866274"/>
+          </a:xfrm>
+          <a:prstGeom prst="leftRightArrow">
+            <a:avLst/>
+          </a:prstGeom>
+          <a:solidFill>
+            <a:schemeClr val="tx1">
+              <a:lumMod val="65000"/>
+              <a:lumOff val="35000"/>
+            </a:schemeClr>
+          </a:solidFill>
+        </p:spPr>
+        <p:style>
+          <a:lnRef idx="2">
+            <a:schemeClr val="accent1">
+              <a:shade val="50000"/>
+            </a:schemeClr>
+          </a:lnRef>
+          <a:fillRef idx="1">
+            <a:schemeClr val="accent1"/>
+          </a:fillRef>
+          <a:effectRef idx="0">
+            <a:schemeClr val="accent1"/>
+          </a:effectRef>
+          <a:fontRef idx="minor">
+            <a:schemeClr val="lt1"/>
+          </a:fontRef>
+        </p:style>
+        <p:txBody>
+          <a:bodyPr rtlCol="0" anchor="ctr"/>
+          <a:lstStyle/>
+          <a:p>
+            <a:pPr algn="ctr"/>
+            <a:r>
+              <a:rPr lang="da-DK" smtClean="0"/>
+              <a:t>EF API</a:t>
+            </a:r>
+            <a:endParaRPr lang="da-DK"/>
+          </a:p>
+        </p:txBody>
+      </p:sp>
+      <p:sp>
+        <p:nvSpPr>
+          <p:cNvPr id="10" name="Magnetpladelager 9"/>
+          <p:cNvSpPr/>
+          <p:nvPr/>
+        </p:nvSpPr>
+        <p:spPr>
+          <a:xfrm>
+            <a:off x="8079204" y="4914253"/>
+            <a:ext cx="3031958" cy="1558737"/>
+          </a:xfrm>
+          <a:prstGeom prst="flowChartMagneticDisk">
+            <a:avLst/>
+          </a:prstGeom>
+          <a:solidFill>
+            <a:schemeClr val="accent6">
+              <a:lumMod val="75000"/>
+            </a:schemeClr>
+          </a:solidFill>
+        </p:spPr>
+        <p:style>
+          <a:lnRef idx="2">
+            <a:schemeClr val="accent1">
+              <a:shade val="50000"/>
+            </a:schemeClr>
+          </a:lnRef>
+          <a:fillRef idx="1">
+            <a:schemeClr val="accent1"/>
+          </a:fillRef>
+          <a:effectRef idx="0">
+            <a:schemeClr val="accent1"/>
+          </a:effectRef>
+          <a:fontRef idx="minor">
+            <a:schemeClr val="lt1"/>
+          </a:fontRef>
+        </p:style>
+        <p:txBody>
+          <a:bodyPr rtlCol="0" anchor="ctr"/>
+          <a:lstStyle/>
+          <a:p>
+            <a:pPr algn="ctr"/>
+            <a:r>
+              <a:rPr lang="da-DK" sz="3600" smtClean="0"/>
+              <a:t>Database</a:t>
+            </a:r>
+            <a:endParaRPr lang="da-DK" sz="3600"/>
+          </a:p>
+        </p:txBody>
+      </p:sp>
+      <p:sp>
+        <p:nvSpPr>
+          <p:cNvPr id="13" name="Opad-nedadgående pil 12"/>
+          <p:cNvSpPr/>
+          <p:nvPr/>
+        </p:nvSpPr>
+        <p:spPr>
+          <a:xfrm>
+            <a:off x="9228220" y="1341519"/>
+            <a:ext cx="733926" cy="3860132"/>
+          </a:xfrm>
+          <a:prstGeom prst="upDownArrow">
+            <a:avLst/>
+          </a:prstGeom>
+          <a:solidFill>
+            <a:schemeClr val="tx1">
+              <a:lumMod val="65000"/>
+              <a:lumOff val="35000"/>
+            </a:schemeClr>
+          </a:solidFill>
+        </p:spPr>
+        <p:style>
+          <a:lnRef idx="2">
+            <a:schemeClr val="accent1">
+              <a:shade val="50000"/>
+            </a:schemeClr>
+          </a:lnRef>
+          <a:fillRef idx="1">
+            <a:schemeClr val="accent1"/>
+          </a:fillRef>
+          <a:effectRef idx="0">
+            <a:schemeClr val="accent1"/>
+          </a:effectRef>
+          <a:fontRef idx="minor">
+            <a:schemeClr val="lt1"/>
+          </a:fontRef>
+        </p:style>
+        <p:txBody>
+          <a:bodyPr rtlCol="0" anchor="ctr"/>
+          <a:lstStyle/>
+          <a:p>
+            <a:pPr algn="ctr"/>
+            <a:endParaRPr lang="da-DK"/>
+          </a:p>
+        </p:txBody>
+      </p:sp>
+      <p:sp>
+        <p:nvSpPr>
+          <p:cNvPr id="12" name="Titel 1"/>
+          <p:cNvSpPr txBox="1">
+            <a:spLocks/>
+          </p:cNvSpPr>
+          <p:nvPr/>
+        </p:nvSpPr>
+        <p:spPr>
+          <a:xfrm>
+            <a:off x="1524001" y="3459079"/>
+            <a:ext cx="2813384" cy="808120"/>
           </a:xfrm>
           <a:prstGeom prst="rect">
             <a:avLst/>
           </a:prstGeom>
-          <a:noFill/>
-        </p:spPr>
-        <p:txBody>
-          <a:bodyPr wrap="square" rtlCol="0">
-            <a:spAutoFit/>
+        </p:spPr>
+        <p:txBody>
+          <a:bodyPr vert="horz" lIns="91440" tIns="45720" rIns="91440" bIns="45720" rtlCol="0" anchor="ctr">
+            <a:noAutofit/>
           </a:bodyPr>
-          <a:lstStyle/>
-          <a:p>
-            <a:r>
-              <a:rPr lang="da-DK" sz="2000" b="1" smtClean="0">
+          <a:lstStyle>
+            <a:lvl1pPr algn="l" defTabSz="914400" rtl="0" eaLnBrk="1" latinLnBrk="0" hangingPunct="1">
+              <a:lnSpc>
+                <a:spcPct val="90000"/>
+              </a:lnSpc>
+              <a:spcBef>
+                <a:spcPct val="0"/>
+              </a:spcBef>
+              <a:buNone/>
+              <a:defRPr sz="4400" kern="1200">
                 <a:solidFill>
-                  <a:srgbClr val="0070C0"/>
+                  <a:schemeClr val="tx1"/>
                 </a:solidFill>
-                <a:latin typeface="Consolas" panose="020B0609020204030204" pitchFamily="49" charset="0"/>
-              </a:rPr>
-              <a:t>if</a:t>
-            </a:r>
-            <a:r>
-              <a:rPr lang="da-DK" sz="2000" b="1" smtClean="0">
-                <a:latin typeface="Consolas" panose="020B0609020204030204" pitchFamily="49" charset="0"/>
-              </a:rPr>
-              <a:t> (age &lt; 13)</a:t>
-            </a:r>
-          </a:p>
-          <a:p>
-            <a:r>
-              <a:rPr lang="da-DK" sz="2000" b="1" smtClean="0">
-                <a:latin typeface="Consolas" panose="020B0609020204030204" pitchFamily="49" charset="0"/>
-              </a:rPr>
-              <a:t>{</a:t>
-            </a:r>
-          </a:p>
-          <a:p>
-            <a:r>
-              <a:rPr lang="da-DK" sz="2000" b="1">
-                <a:latin typeface="Consolas" panose="020B0609020204030204" pitchFamily="49" charset="0"/>
-              </a:rPr>
-              <a:t> </a:t>
-            </a:r>
-            <a:r>
-              <a:rPr lang="da-DK" sz="2000" b="1" smtClean="0">
-                <a:latin typeface="Consolas" panose="020B0609020204030204" pitchFamily="49" charset="0"/>
-              </a:rPr>
-              <a:t>  </a:t>
-            </a:r>
-            <a:r>
-              <a:rPr lang="da-DK" sz="2000" b="1">
-                <a:latin typeface="Consolas" panose="020B0609020204030204" pitchFamily="49" charset="0"/>
-              </a:rPr>
-              <a:t>price = 25;</a:t>
-            </a:r>
-          </a:p>
-          <a:p>
-            <a:r>
-              <a:rPr lang="da-DK" sz="2000" b="1" smtClean="0">
-                <a:latin typeface="Consolas" panose="020B0609020204030204" pitchFamily="49" charset="0"/>
-              </a:rPr>
-              <a:t>}</a:t>
-            </a:r>
+                <a:latin typeface="+mj-lt"/>
+                <a:ea typeface="+mj-ea"/>
+                <a:cs typeface="+mj-cs"/>
+              </a:defRPr>
+            </a:lvl1pPr>
+          </a:lstStyle>
+          <a:p>
+            <a:r>
+              <a:rPr lang="da-DK" sz="4800" b="1" smtClean="0"/>
+              <a:t>Stage 1</a:t>
+            </a:r>
+            <a:endParaRPr lang="da-DK" sz="4800" b="1"/>
           </a:p>
         </p:txBody>
       </p:sp>
     </p:spTree>
     <p:extLst>
       <p:ext uri="{BB962C8B-B14F-4D97-AF65-F5344CB8AC3E}">
-        <p14:creationId xmlns:p14="http://schemas.microsoft.com/office/powerpoint/2010/main" val="2229540645"/>
+        <p14:creationId xmlns:p14="http://schemas.microsoft.com/office/powerpoint/2010/main" val="3279098060"/>
+      </p:ext>
+    </p:extLst>
+  </p:cSld>
+  <p:clrMapOvr>
+    <a:masterClrMapping/>
+  </p:clrMapOvr>
+  <mc:AlternateContent xmlns:mc="http://schemas.openxmlformats.org/markup-compatibility/2006" xmlns:p14="http://schemas.microsoft.com/office/powerpoint/2010/main">
+    <mc:Choice Requires="p14">
+      <p:transition spd="med" p14:dur="700">
+        <p:fade/>
+      </p:transition>
+    </mc:Choice>
+    <mc:Fallback xmlns="">
+      <p:transition spd="med">
+        <p:fade/>
+      </p:transition>
+    </mc:Fallback>
+  </mc:AlternateContent>
+  <p:timing>
+    <p:tnLst>
+      <p:par>
+        <p:cTn id="1" dur="indefinite" restart="never" nodeType="tmRoot"/>
+      </p:par>
+    </p:tnLst>
+  </p:timing>
+</p:sld>
+</file>
+
+<file path=ppt/slides/slide14.xml><?xml version="1.0" encoding="utf-8"?>
+<p:sld xmlns:a="http://schemas.openxmlformats.org/drawingml/2006/main" xmlns:r="http://schemas.openxmlformats.org/officeDocument/2006/relationships" xmlns:p="http://schemas.openxmlformats.org/presentationml/2006/main">
+  <p:cSld>
+    <p:spTree>
+      <p:nvGrpSpPr>
+        <p:cNvPr id="1" name=""/>
+        <p:cNvGrpSpPr/>
+        <p:nvPr/>
+      </p:nvGrpSpPr>
+      <p:grpSpPr>
+        <a:xfrm>
+          <a:off x="0" y="0"/>
+          <a:ext cx="0" cy="0"/>
+          <a:chOff x="0" y="0"/>
+          <a:chExt cx="0" cy="0"/>
+        </a:xfrm>
+      </p:grpSpPr>
+      <p:sp>
+        <p:nvSpPr>
+          <p:cNvPr id="10" name="Afrundet rektangel 9"/>
+          <p:cNvSpPr/>
+          <p:nvPr/>
+        </p:nvSpPr>
+        <p:spPr>
+          <a:xfrm>
+            <a:off x="1124953" y="210552"/>
+            <a:ext cx="2045368" cy="1395663"/>
+          </a:xfrm>
+          <a:prstGeom prst="roundRect">
+            <a:avLst/>
+          </a:prstGeom>
+        </p:spPr>
+        <p:style>
+          <a:lnRef idx="2">
+            <a:schemeClr val="accent1">
+              <a:shade val="50000"/>
+            </a:schemeClr>
+          </a:lnRef>
+          <a:fillRef idx="1">
+            <a:schemeClr val="accent1"/>
+          </a:fillRef>
+          <a:effectRef idx="0">
+            <a:schemeClr val="accent1"/>
+          </a:effectRef>
+          <a:fontRef idx="minor">
+            <a:schemeClr val="lt1"/>
+          </a:fontRef>
+        </p:style>
+        <p:txBody>
+          <a:bodyPr rtlCol="0" anchor="ctr"/>
+          <a:lstStyle/>
+          <a:p>
+            <a:pPr algn="ctr"/>
+            <a:r>
+              <a:rPr lang="da-DK" sz="3600" smtClean="0"/>
+              <a:t>App</a:t>
+            </a:r>
+          </a:p>
+          <a:p>
+            <a:pPr algn="ctr"/>
+            <a:r>
+              <a:rPr lang="da-DK" sz="2400" smtClean="0"/>
+              <a:t>(Console)</a:t>
+            </a:r>
+            <a:endParaRPr lang="da-DK" sz="2400"/>
+          </a:p>
+        </p:txBody>
+      </p:sp>
+      <p:sp>
+        <p:nvSpPr>
+          <p:cNvPr id="9" name="Afrundet rektangel 8"/>
+          <p:cNvSpPr/>
+          <p:nvPr/>
+        </p:nvSpPr>
+        <p:spPr>
+          <a:xfrm>
+            <a:off x="6346658" y="134352"/>
+            <a:ext cx="5528509" cy="6519111"/>
+          </a:xfrm>
+          <a:prstGeom prst="roundRect">
+            <a:avLst/>
+          </a:prstGeom>
+          <a:solidFill>
+            <a:schemeClr val="bg1">
+              <a:lumMod val="50000"/>
+            </a:schemeClr>
+          </a:solidFill>
+          <a:ln>
+            <a:solidFill>
+              <a:schemeClr val="bg1">
+                <a:lumMod val="50000"/>
+              </a:schemeClr>
+            </a:solidFill>
+          </a:ln>
+        </p:spPr>
+        <p:style>
+          <a:lnRef idx="2">
+            <a:schemeClr val="accent1">
+              <a:shade val="50000"/>
+            </a:schemeClr>
+          </a:lnRef>
+          <a:fillRef idx="1">
+            <a:schemeClr val="accent1"/>
+          </a:fillRef>
+          <a:effectRef idx="0">
+            <a:schemeClr val="accent1"/>
+          </a:effectRef>
+          <a:fontRef idx="minor">
+            <a:schemeClr val="lt1"/>
+          </a:fontRef>
+        </p:style>
+        <p:txBody>
+          <a:bodyPr rtlCol="0" anchor="ctr"/>
+          <a:lstStyle/>
+          <a:p>
+            <a:r>
+              <a:rPr lang="da-DK" sz="3200" smtClean="0">
+                <a:solidFill>
+                  <a:srgbClr val="FFFF00"/>
+                </a:solidFill>
+              </a:rPr>
+              <a:t>Local</a:t>
+            </a:r>
+            <a:endParaRPr lang="da-DK" sz="3200">
+              <a:solidFill>
+                <a:srgbClr val="FFFF00"/>
+              </a:solidFill>
+            </a:endParaRPr>
+          </a:p>
+        </p:txBody>
+      </p:sp>
+      <p:sp>
+        <p:nvSpPr>
+          <p:cNvPr id="5" name="Afrundet rektangel 4"/>
+          <p:cNvSpPr/>
+          <p:nvPr/>
+        </p:nvSpPr>
+        <p:spPr>
+          <a:xfrm>
+            <a:off x="8079204" y="210551"/>
+            <a:ext cx="3031958" cy="1395663"/>
+          </a:xfrm>
+          <a:prstGeom prst="roundRect">
+            <a:avLst/>
+          </a:prstGeom>
+          <a:solidFill>
+            <a:srgbClr val="C00000"/>
+          </a:solidFill>
+        </p:spPr>
+        <p:style>
+          <a:lnRef idx="2">
+            <a:schemeClr val="accent1">
+              <a:shade val="50000"/>
+            </a:schemeClr>
+          </a:lnRef>
+          <a:fillRef idx="1">
+            <a:schemeClr val="accent1"/>
+          </a:fillRef>
+          <a:effectRef idx="0">
+            <a:schemeClr val="accent1"/>
+          </a:effectRef>
+          <a:fontRef idx="minor">
+            <a:schemeClr val="lt1"/>
+          </a:fontRef>
+        </p:style>
+        <p:txBody>
+          <a:bodyPr rtlCol="0" anchor="ctr"/>
+          <a:lstStyle/>
+          <a:p>
+            <a:pPr algn="ctr"/>
+            <a:r>
+              <a:rPr lang="da-DK" sz="3600" smtClean="0"/>
+              <a:t>Web Service</a:t>
+            </a:r>
+          </a:p>
+        </p:txBody>
+      </p:sp>
+      <p:sp>
+        <p:nvSpPr>
+          <p:cNvPr id="2" name="Magnetpladelager 1"/>
+          <p:cNvSpPr/>
+          <p:nvPr/>
+        </p:nvSpPr>
+        <p:spPr>
+          <a:xfrm>
+            <a:off x="8079204" y="4855745"/>
+            <a:ext cx="3031958" cy="1617245"/>
+          </a:xfrm>
+          <a:prstGeom prst="flowChartMagneticDisk">
+            <a:avLst/>
+          </a:prstGeom>
+          <a:solidFill>
+            <a:schemeClr val="accent6">
+              <a:lumMod val="75000"/>
+            </a:schemeClr>
+          </a:solidFill>
+        </p:spPr>
+        <p:style>
+          <a:lnRef idx="2">
+            <a:schemeClr val="accent1">
+              <a:shade val="50000"/>
+            </a:schemeClr>
+          </a:lnRef>
+          <a:fillRef idx="1">
+            <a:schemeClr val="accent1"/>
+          </a:fillRef>
+          <a:effectRef idx="0">
+            <a:schemeClr val="accent1"/>
+          </a:effectRef>
+          <a:fontRef idx="minor">
+            <a:schemeClr val="lt1"/>
+          </a:fontRef>
+        </p:style>
+        <p:txBody>
+          <a:bodyPr rtlCol="0" anchor="ctr"/>
+          <a:lstStyle/>
+          <a:p>
+            <a:pPr algn="ctr"/>
+            <a:r>
+              <a:rPr lang="da-DK" sz="3600" smtClean="0"/>
+              <a:t>Database</a:t>
+            </a:r>
+            <a:endParaRPr lang="da-DK" sz="3600"/>
+          </a:p>
+        </p:txBody>
+      </p:sp>
+      <p:sp>
+        <p:nvSpPr>
+          <p:cNvPr id="11" name="Afrundet rektangel 10"/>
+          <p:cNvSpPr/>
+          <p:nvPr/>
+        </p:nvSpPr>
+        <p:spPr>
+          <a:xfrm>
+            <a:off x="8079204" y="2594806"/>
+            <a:ext cx="3031958" cy="1395663"/>
+          </a:xfrm>
+          <a:prstGeom prst="roundRect">
+            <a:avLst/>
+          </a:prstGeom>
+          <a:solidFill>
+            <a:schemeClr val="accent5">
+              <a:lumMod val="75000"/>
+            </a:schemeClr>
+          </a:solidFill>
+        </p:spPr>
+        <p:style>
+          <a:lnRef idx="2">
+            <a:schemeClr val="accent1">
+              <a:shade val="50000"/>
+            </a:schemeClr>
+          </a:lnRef>
+          <a:fillRef idx="1">
+            <a:schemeClr val="accent1"/>
+          </a:fillRef>
+          <a:effectRef idx="0">
+            <a:schemeClr val="accent1"/>
+          </a:effectRef>
+          <a:fontRef idx="minor">
+            <a:schemeClr val="lt1"/>
+          </a:fontRef>
+        </p:style>
+        <p:txBody>
+          <a:bodyPr rtlCol="0" anchor="ctr"/>
+          <a:lstStyle/>
+          <a:p>
+            <a:pPr algn="ctr"/>
+            <a:r>
+              <a:rPr lang="da-DK" sz="3600" smtClean="0"/>
+              <a:t>Entity Framework</a:t>
+            </a:r>
+          </a:p>
+        </p:txBody>
+      </p:sp>
+      <p:sp>
+        <p:nvSpPr>
+          <p:cNvPr id="12" name="Opad-nedadgående pil 11"/>
+          <p:cNvSpPr/>
+          <p:nvPr/>
+        </p:nvSpPr>
+        <p:spPr>
+          <a:xfrm>
+            <a:off x="9228220" y="3830048"/>
+            <a:ext cx="733926" cy="1371603"/>
+          </a:xfrm>
+          <a:prstGeom prst="upDownArrow">
+            <a:avLst/>
+          </a:prstGeom>
+          <a:solidFill>
+            <a:schemeClr val="tx1">
+              <a:lumMod val="65000"/>
+              <a:lumOff val="35000"/>
+            </a:schemeClr>
+          </a:solidFill>
+        </p:spPr>
+        <p:style>
+          <a:lnRef idx="2">
+            <a:schemeClr val="accent1">
+              <a:shade val="50000"/>
+            </a:schemeClr>
+          </a:lnRef>
+          <a:fillRef idx="1">
+            <a:schemeClr val="accent1"/>
+          </a:fillRef>
+          <a:effectRef idx="0">
+            <a:schemeClr val="accent1"/>
+          </a:effectRef>
+          <a:fontRef idx="minor">
+            <a:schemeClr val="lt1"/>
+          </a:fontRef>
+        </p:style>
+        <p:txBody>
+          <a:bodyPr rtlCol="0" anchor="ctr"/>
+          <a:lstStyle/>
+          <a:p>
+            <a:pPr algn="ctr"/>
+            <a:endParaRPr lang="da-DK"/>
+          </a:p>
+        </p:txBody>
+      </p:sp>
+      <p:sp>
+        <p:nvSpPr>
+          <p:cNvPr id="15" name="Opad-nedadgående pil 14"/>
+          <p:cNvSpPr/>
+          <p:nvPr/>
+        </p:nvSpPr>
+        <p:spPr>
+          <a:xfrm>
+            <a:off x="9228220" y="1414709"/>
+            <a:ext cx="733926" cy="1371603"/>
+          </a:xfrm>
+          <a:prstGeom prst="upDownArrow">
+            <a:avLst/>
+          </a:prstGeom>
+          <a:solidFill>
+            <a:schemeClr val="tx1">
+              <a:lumMod val="65000"/>
+              <a:lumOff val="35000"/>
+            </a:schemeClr>
+          </a:solidFill>
+        </p:spPr>
+        <p:style>
+          <a:lnRef idx="2">
+            <a:schemeClr val="accent1">
+              <a:shade val="50000"/>
+            </a:schemeClr>
+          </a:lnRef>
+          <a:fillRef idx="1">
+            <a:schemeClr val="accent1"/>
+          </a:fillRef>
+          <a:effectRef idx="0">
+            <a:schemeClr val="accent1"/>
+          </a:effectRef>
+          <a:fontRef idx="minor">
+            <a:schemeClr val="lt1"/>
+          </a:fontRef>
+        </p:style>
+        <p:txBody>
+          <a:bodyPr rtlCol="0" anchor="ctr"/>
+          <a:lstStyle/>
+          <a:p>
+            <a:pPr algn="ctr"/>
+            <a:endParaRPr lang="da-DK"/>
+          </a:p>
+        </p:txBody>
+      </p:sp>
+      <p:sp>
+        <p:nvSpPr>
+          <p:cNvPr id="6" name="Højre-venstrepil 5"/>
+          <p:cNvSpPr/>
+          <p:nvPr/>
+        </p:nvSpPr>
+        <p:spPr>
+          <a:xfrm>
+            <a:off x="3001879" y="475245"/>
+            <a:ext cx="5263816" cy="866274"/>
+          </a:xfrm>
+          <a:prstGeom prst="leftRightArrow">
+            <a:avLst/>
+          </a:prstGeom>
+          <a:solidFill>
+            <a:schemeClr val="tx1">
+              <a:lumMod val="65000"/>
+              <a:lumOff val="35000"/>
+            </a:schemeClr>
+          </a:solidFill>
+        </p:spPr>
+        <p:style>
+          <a:lnRef idx="2">
+            <a:schemeClr val="accent1">
+              <a:shade val="50000"/>
+            </a:schemeClr>
+          </a:lnRef>
+          <a:fillRef idx="1">
+            <a:schemeClr val="accent1"/>
+          </a:fillRef>
+          <a:effectRef idx="0">
+            <a:schemeClr val="accent1"/>
+          </a:effectRef>
+          <a:fontRef idx="minor">
+            <a:schemeClr val="lt1"/>
+          </a:fontRef>
+        </p:style>
+        <p:txBody>
+          <a:bodyPr rtlCol="0" anchor="ctr"/>
+          <a:lstStyle/>
+          <a:p>
+            <a:pPr algn="ctr"/>
+            <a:r>
+              <a:rPr lang="da-DK" smtClean="0"/>
+              <a:t>HTTP Request/Response</a:t>
+            </a:r>
+            <a:endParaRPr lang="da-DK"/>
+          </a:p>
+        </p:txBody>
+      </p:sp>
+      <p:sp>
+        <p:nvSpPr>
+          <p:cNvPr id="13" name="Titel 1"/>
+          <p:cNvSpPr txBox="1">
+            <a:spLocks/>
+          </p:cNvSpPr>
+          <p:nvPr/>
+        </p:nvSpPr>
+        <p:spPr>
+          <a:xfrm>
+            <a:off x="1524001" y="3459079"/>
+            <a:ext cx="2813384" cy="808120"/>
+          </a:xfrm>
+          <a:prstGeom prst="rect">
+            <a:avLst/>
+          </a:prstGeom>
+        </p:spPr>
+        <p:txBody>
+          <a:bodyPr vert="horz" lIns="91440" tIns="45720" rIns="91440" bIns="45720" rtlCol="0" anchor="ctr">
+            <a:noAutofit/>
+          </a:bodyPr>
+          <a:lstStyle>
+            <a:lvl1pPr algn="l" defTabSz="914400" rtl="0" eaLnBrk="1" latinLnBrk="0" hangingPunct="1">
+              <a:lnSpc>
+                <a:spcPct val="90000"/>
+              </a:lnSpc>
+              <a:spcBef>
+                <a:spcPct val="0"/>
+              </a:spcBef>
+              <a:buNone/>
+              <a:defRPr sz="4400" kern="1200">
+                <a:solidFill>
+                  <a:schemeClr val="tx1"/>
+                </a:solidFill>
+                <a:latin typeface="+mj-lt"/>
+                <a:ea typeface="+mj-ea"/>
+                <a:cs typeface="+mj-cs"/>
+              </a:defRPr>
+            </a:lvl1pPr>
+          </a:lstStyle>
+          <a:p>
+            <a:r>
+              <a:rPr lang="da-DK" sz="4800" b="1" smtClean="0"/>
+              <a:t>Stage 2</a:t>
+            </a:r>
+            <a:endParaRPr lang="da-DK" sz="4800" b="1"/>
+          </a:p>
+        </p:txBody>
+      </p:sp>
+    </p:spTree>
+    <p:extLst>
+      <p:ext uri="{BB962C8B-B14F-4D97-AF65-F5344CB8AC3E}">
+        <p14:creationId xmlns:p14="http://schemas.microsoft.com/office/powerpoint/2010/main" val="1587530125"/>
+      </p:ext>
+    </p:extLst>
+  </p:cSld>
+  <p:clrMapOvr>
+    <a:masterClrMapping/>
+  </p:clrMapOvr>
+  <mc:AlternateContent xmlns:mc="http://schemas.openxmlformats.org/markup-compatibility/2006" xmlns:p14="http://schemas.microsoft.com/office/powerpoint/2010/main">
+    <mc:Choice Requires="p14">
+      <p:transition spd="med" p14:dur="700">
+        <p:fade/>
+      </p:transition>
+    </mc:Choice>
+    <mc:Fallback xmlns="">
+      <p:transition spd="med">
+        <p:fade/>
+      </p:transition>
+    </mc:Fallback>
+  </mc:AlternateContent>
+  <p:timing>
+    <p:tnLst>
+      <p:par>
+        <p:cTn id="1" dur="indefinite" restart="never" nodeType="tmRoot"/>
+      </p:par>
+    </p:tnLst>
+  </p:timing>
+</p:sld>
+</file>
+
+<file path=ppt/slides/slide15.xml><?xml version="1.0" encoding="utf-8"?>
+<p:sld xmlns:a="http://schemas.openxmlformats.org/drawingml/2006/main" xmlns:r="http://schemas.openxmlformats.org/officeDocument/2006/relationships" xmlns:p="http://schemas.openxmlformats.org/presentationml/2006/main">
+  <p:cSld>
+    <p:spTree>
+      <p:nvGrpSpPr>
+        <p:cNvPr id="1" name=""/>
+        <p:cNvGrpSpPr/>
+        <p:nvPr/>
+      </p:nvGrpSpPr>
+      <p:grpSpPr>
+        <a:xfrm>
+          <a:off x="0" y="0"/>
+          <a:ext cx="0" cy="0"/>
+          <a:chOff x="0" y="0"/>
+          <a:chExt cx="0" cy="0"/>
+        </a:xfrm>
+      </p:grpSpPr>
+      <p:sp>
+        <p:nvSpPr>
+          <p:cNvPr id="10" name="Afrundet rektangel 9"/>
+          <p:cNvSpPr/>
+          <p:nvPr/>
+        </p:nvSpPr>
+        <p:spPr>
+          <a:xfrm>
+            <a:off x="1124953" y="210552"/>
+            <a:ext cx="2045368" cy="1395663"/>
+          </a:xfrm>
+          <a:prstGeom prst="roundRect">
+            <a:avLst/>
+          </a:prstGeom>
+        </p:spPr>
+        <p:style>
+          <a:lnRef idx="2">
+            <a:schemeClr val="accent1">
+              <a:shade val="50000"/>
+            </a:schemeClr>
+          </a:lnRef>
+          <a:fillRef idx="1">
+            <a:schemeClr val="accent1"/>
+          </a:fillRef>
+          <a:effectRef idx="0">
+            <a:schemeClr val="accent1"/>
+          </a:effectRef>
+          <a:fontRef idx="minor">
+            <a:schemeClr val="lt1"/>
+          </a:fontRef>
+        </p:style>
+        <p:txBody>
+          <a:bodyPr rtlCol="0" anchor="ctr"/>
+          <a:lstStyle/>
+          <a:p>
+            <a:pPr algn="ctr"/>
+            <a:r>
+              <a:rPr lang="da-DK" sz="3600" smtClean="0"/>
+              <a:t>App</a:t>
+            </a:r>
+          </a:p>
+          <a:p>
+            <a:pPr algn="ctr"/>
+            <a:r>
+              <a:rPr lang="da-DK" sz="2400" smtClean="0"/>
+              <a:t>(UWP)</a:t>
+            </a:r>
+            <a:endParaRPr lang="da-DK" sz="2400"/>
+          </a:p>
+        </p:txBody>
+      </p:sp>
+      <p:sp>
+        <p:nvSpPr>
+          <p:cNvPr id="9" name="Afrundet rektangel 8"/>
+          <p:cNvSpPr/>
+          <p:nvPr/>
+        </p:nvSpPr>
+        <p:spPr>
+          <a:xfrm>
+            <a:off x="6346658" y="134352"/>
+            <a:ext cx="5528509" cy="6519111"/>
+          </a:xfrm>
+          <a:prstGeom prst="roundRect">
+            <a:avLst/>
+          </a:prstGeom>
+          <a:solidFill>
+            <a:schemeClr val="bg1">
+              <a:lumMod val="50000"/>
+            </a:schemeClr>
+          </a:solidFill>
+          <a:ln>
+            <a:solidFill>
+              <a:schemeClr val="bg1">
+                <a:lumMod val="50000"/>
+              </a:schemeClr>
+            </a:solidFill>
+          </a:ln>
+        </p:spPr>
+        <p:style>
+          <a:lnRef idx="2">
+            <a:schemeClr val="accent1">
+              <a:shade val="50000"/>
+            </a:schemeClr>
+          </a:lnRef>
+          <a:fillRef idx="1">
+            <a:schemeClr val="accent1"/>
+          </a:fillRef>
+          <a:effectRef idx="0">
+            <a:schemeClr val="accent1"/>
+          </a:effectRef>
+          <a:fontRef idx="minor">
+            <a:schemeClr val="lt1"/>
+          </a:fontRef>
+        </p:style>
+        <p:txBody>
+          <a:bodyPr rtlCol="0" anchor="ctr"/>
+          <a:lstStyle/>
+          <a:p>
+            <a:r>
+              <a:rPr lang="da-DK" sz="3200" smtClean="0">
+                <a:solidFill>
+                  <a:srgbClr val="FFFF00"/>
+                </a:solidFill>
+              </a:rPr>
+              <a:t>Local</a:t>
+            </a:r>
+            <a:endParaRPr lang="da-DK" sz="3200">
+              <a:solidFill>
+                <a:srgbClr val="FFFF00"/>
+              </a:solidFill>
+            </a:endParaRPr>
+          </a:p>
+        </p:txBody>
+      </p:sp>
+      <p:sp>
+        <p:nvSpPr>
+          <p:cNvPr id="5" name="Afrundet rektangel 4"/>
+          <p:cNvSpPr/>
+          <p:nvPr/>
+        </p:nvSpPr>
+        <p:spPr>
+          <a:xfrm>
+            <a:off x="8079204" y="210551"/>
+            <a:ext cx="3031958" cy="1395663"/>
+          </a:xfrm>
+          <a:prstGeom prst="roundRect">
+            <a:avLst/>
+          </a:prstGeom>
+          <a:solidFill>
+            <a:srgbClr val="C00000"/>
+          </a:solidFill>
+        </p:spPr>
+        <p:style>
+          <a:lnRef idx="2">
+            <a:schemeClr val="accent1">
+              <a:shade val="50000"/>
+            </a:schemeClr>
+          </a:lnRef>
+          <a:fillRef idx="1">
+            <a:schemeClr val="accent1"/>
+          </a:fillRef>
+          <a:effectRef idx="0">
+            <a:schemeClr val="accent1"/>
+          </a:effectRef>
+          <a:fontRef idx="minor">
+            <a:schemeClr val="lt1"/>
+          </a:fontRef>
+        </p:style>
+        <p:txBody>
+          <a:bodyPr rtlCol="0" anchor="ctr"/>
+          <a:lstStyle/>
+          <a:p>
+            <a:pPr algn="ctr"/>
+            <a:r>
+              <a:rPr lang="da-DK" sz="3600" smtClean="0"/>
+              <a:t>Web Service</a:t>
+            </a:r>
+          </a:p>
+        </p:txBody>
+      </p:sp>
+      <p:sp>
+        <p:nvSpPr>
+          <p:cNvPr id="2" name="Magnetpladelager 1"/>
+          <p:cNvSpPr/>
+          <p:nvPr/>
+        </p:nvSpPr>
+        <p:spPr>
+          <a:xfrm>
+            <a:off x="8079204" y="4855745"/>
+            <a:ext cx="3031958" cy="1617245"/>
+          </a:xfrm>
+          <a:prstGeom prst="flowChartMagneticDisk">
+            <a:avLst/>
+          </a:prstGeom>
+          <a:solidFill>
+            <a:schemeClr val="accent6">
+              <a:lumMod val="75000"/>
+            </a:schemeClr>
+          </a:solidFill>
+        </p:spPr>
+        <p:style>
+          <a:lnRef idx="2">
+            <a:schemeClr val="accent1">
+              <a:shade val="50000"/>
+            </a:schemeClr>
+          </a:lnRef>
+          <a:fillRef idx="1">
+            <a:schemeClr val="accent1"/>
+          </a:fillRef>
+          <a:effectRef idx="0">
+            <a:schemeClr val="accent1"/>
+          </a:effectRef>
+          <a:fontRef idx="minor">
+            <a:schemeClr val="lt1"/>
+          </a:fontRef>
+        </p:style>
+        <p:txBody>
+          <a:bodyPr rtlCol="0" anchor="ctr"/>
+          <a:lstStyle/>
+          <a:p>
+            <a:pPr algn="ctr"/>
+            <a:r>
+              <a:rPr lang="da-DK" sz="3600" smtClean="0"/>
+              <a:t>Database</a:t>
+            </a:r>
+            <a:endParaRPr lang="da-DK" sz="3600"/>
+          </a:p>
+        </p:txBody>
+      </p:sp>
+      <p:sp>
+        <p:nvSpPr>
+          <p:cNvPr id="11" name="Afrundet rektangel 10"/>
+          <p:cNvSpPr/>
+          <p:nvPr/>
+        </p:nvSpPr>
+        <p:spPr>
+          <a:xfrm>
+            <a:off x="8079204" y="2594806"/>
+            <a:ext cx="3031958" cy="1395663"/>
+          </a:xfrm>
+          <a:prstGeom prst="roundRect">
+            <a:avLst/>
+          </a:prstGeom>
+          <a:solidFill>
+            <a:schemeClr val="accent5">
+              <a:lumMod val="75000"/>
+            </a:schemeClr>
+          </a:solidFill>
+        </p:spPr>
+        <p:style>
+          <a:lnRef idx="2">
+            <a:schemeClr val="accent1">
+              <a:shade val="50000"/>
+            </a:schemeClr>
+          </a:lnRef>
+          <a:fillRef idx="1">
+            <a:schemeClr val="accent1"/>
+          </a:fillRef>
+          <a:effectRef idx="0">
+            <a:schemeClr val="accent1"/>
+          </a:effectRef>
+          <a:fontRef idx="minor">
+            <a:schemeClr val="lt1"/>
+          </a:fontRef>
+        </p:style>
+        <p:txBody>
+          <a:bodyPr rtlCol="0" anchor="ctr"/>
+          <a:lstStyle/>
+          <a:p>
+            <a:pPr algn="ctr"/>
+            <a:r>
+              <a:rPr lang="da-DK" sz="3600" smtClean="0"/>
+              <a:t>Entity Framework</a:t>
+            </a:r>
+          </a:p>
+        </p:txBody>
+      </p:sp>
+      <p:sp>
+        <p:nvSpPr>
+          <p:cNvPr id="12" name="Opad-nedadgående pil 11"/>
+          <p:cNvSpPr/>
+          <p:nvPr/>
+        </p:nvSpPr>
+        <p:spPr>
+          <a:xfrm>
+            <a:off x="9228220" y="3830048"/>
+            <a:ext cx="733926" cy="1371603"/>
+          </a:xfrm>
+          <a:prstGeom prst="upDownArrow">
+            <a:avLst/>
+          </a:prstGeom>
+          <a:solidFill>
+            <a:schemeClr val="tx1">
+              <a:lumMod val="65000"/>
+              <a:lumOff val="35000"/>
+            </a:schemeClr>
+          </a:solidFill>
+        </p:spPr>
+        <p:style>
+          <a:lnRef idx="2">
+            <a:schemeClr val="accent1">
+              <a:shade val="50000"/>
+            </a:schemeClr>
+          </a:lnRef>
+          <a:fillRef idx="1">
+            <a:schemeClr val="accent1"/>
+          </a:fillRef>
+          <a:effectRef idx="0">
+            <a:schemeClr val="accent1"/>
+          </a:effectRef>
+          <a:fontRef idx="minor">
+            <a:schemeClr val="lt1"/>
+          </a:fontRef>
+        </p:style>
+        <p:txBody>
+          <a:bodyPr rtlCol="0" anchor="ctr"/>
+          <a:lstStyle/>
+          <a:p>
+            <a:pPr algn="ctr"/>
+            <a:endParaRPr lang="da-DK"/>
+          </a:p>
+        </p:txBody>
+      </p:sp>
+      <p:sp>
+        <p:nvSpPr>
+          <p:cNvPr id="15" name="Opad-nedadgående pil 14"/>
+          <p:cNvSpPr/>
+          <p:nvPr/>
+        </p:nvSpPr>
+        <p:spPr>
+          <a:xfrm>
+            <a:off x="9228220" y="1414709"/>
+            <a:ext cx="733926" cy="1371603"/>
+          </a:xfrm>
+          <a:prstGeom prst="upDownArrow">
+            <a:avLst/>
+          </a:prstGeom>
+          <a:solidFill>
+            <a:schemeClr val="tx1">
+              <a:lumMod val="65000"/>
+              <a:lumOff val="35000"/>
+            </a:schemeClr>
+          </a:solidFill>
+        </p:spPr>
+        <p:style>
+          <a:lnRef idx="2">
+            <a:schemeClr val="accent1">
+              <a:shade val="50000"/>
+            </a:schemeClr>
+          </a:lnRef>
+          <a:fillRef idx="1">
+            <a:schemeClr val="accent1"/>
+          </a:fillRef>
+          <a:effectRef idx="0">
+            <a:schemeClr val="accent1"/>
+          </a:effectRef>
+          <a:fontRef idx="minor">
+            <a:schemeClr val="lt1"/>
+          </a:fontRef>
+        </p:style>
+        <p:txBody>
+          <a:bodyPr rtlCol="0" anchor="ctr"/>
+          <a:lstStyle/>
+          <a:p>
+            <a:pPr algn="ctr"/>
+            <a:endParaRPr lang="da-DK"/>
+          </a:p>
+        </p:txBody>
+      </p:sp>
+      <p:sp>
+        <p:nvSpPr>
+          <p:cNvPr id="6" name="Højre-venstrepil 5"/>
+          <p:cNvSpPr/>
+          <p:nvPr/>
+        </p:nvSpPr>
+        <p:spPr>
+          <a:xfrm>
+            <a:off x="3001879" y="475245"/>
+            <a:ext cx="5263816" cy="866274"/>
+          </a:xfrm>
+          <a:prstGeom prst="leftRightArrow">
+            <a:avLst/>
+          </a:prstGeom>
+          <a:solidFill>
+            <a:schemeClr val="tx1">
+              <a:lumMod val="65000"/>
+              <a:lumOff val="35000"/>
+            </a:schemeClr>
+          </a:solidFill>
+        </p:spPr>
+        <p:style>
+          <a:lnRef idx="2">
+            <a:schemeClr val="accent1">
+              <a:shade val="50000"/>
+            </a:schemeClr>
+          </a:lnRef>
+          <a:fillRef idx="1">
+            <a:schemeClr val="accent1"/>
+          </a:fillRef>
+          <a:effectRef idx="0">
+            <a:schemeClr val="accent1"/>
+          </a:effectRef>
+          <a:fontRef idx="minor">
+            <a:schemeClr val="lt1"/>
+          </a:fontRef>
+        </p:style>
+        <p:txBody>
+          <a:bodyPr rtlCol="0" anchor="ctr"/>
+          <a:lstStyle/>
+          <a:p>
+            <a:pPr algn="ctr"/>
+            <a:r>
+              <a:rPr lang="da-DK" smtClean="0"/>
+              <a:t>HTTP Request/Response</a:t>
+            </a:r>
+            <a:endParaRPr lang="da-DK"/>
+          </a:p>
+        </p:txBody>
+      </p:sp>
+      <p:sp>
+        <p:nvSpPr>
+          <p:cNvPr id="13" name="Titel 1"/>
+          <p:cNvSpPr txBox="1">
+            <a:spLocks/>
+          </p:cNvSpPr>
+          <p:nvPr/>
+        </p:nvSpPr>
+        <p:spPr>
+          <a:xfrm>
+            <a:off x="1524001" y="3459079"/>
+            <a:ext cx="2813384" cy="808120"/>
+          </a:xfrm>
+          <a:prstGeom prst="rect">
+            <a:avLst/>
+          </a:prstGeom>
+        </p:spPr>
+        <p:txBody>
+          <a:bodyPr vert="horz" lIns="91440" tIns="45720" rIns="91440" bIns="45720" rtlCol="0" anchor="ctr">
+            <a:noAutofit/>
+          </a:bodyPr>
+          <a:lstStyle>
+            <a:lvl1pPr algn="l" defTabSz="914400" rtl="0" eaLnBrk="1" latinLnBrk="0" hangingPunct="1">
+              <a:lnSpc>
+                <a:spcPct val="90000"/>
+              </a:lnSpc>
+              <a:spcBef>
+                <a:spcPct val="0"/>
+              </a:spcBef>
+              <a:buNone/>
+              <a:defRPr sz="4400" kern="1200">
+                <a:solidFill>
+                  <a:schemeClr val="tx1"/>
+                </a:solidFill>
+                <a:latin typeface="+mj-lt"/>
+                <a:ea typeface="+mj-ea"/>
+                <a:cs typeface="+mj-cs"/>
+              </a:defRPr>
+            </a:lvl1pPr>
+          </a:lstStyle>
+          <a:p>
+            <a:r>
+              <a:rPr lang="da-DK" sz="4800" b="1" smtClean="0"/>
+              <a:t>Stage 3</a:t>
+            </a:r>
+            <a:endParaRPr lang="da-DK" sz="4800" b="1"/>
+          </a:p>
+        </p:txBody>
+      </p:sp>
+    </p:spTree>
+    <p:extLst>
+      <p:ext uri="{BB962C8B-B14F-4D97-AF65-F5344CB8AC3E}">
+        <p14:creationId xmlns:p14="http://schemas.microsoft.com/office/powerpoint/2010/main" val="1064052435"/>
+      </p:ext>
+    </p:extLst>
+  </p:cSld>
+  <p:clrMapOvr>
+    <a:masterClrMapping/>
+  </p:clrMapOvr>
+  <mc:AlternateContent xmlns:mc="http://schemas.openxmlformats.org/markup-compatibility/2006" xmlns:p14="http://schemas.microsoft.com/office/powerpoint/2010/main">
+    <mc:Choice Requires="p14">
+      <p:transition spd="med" p14:dur="700">
+        <p:fade/>
+      </p:transition>
+    </mc:Choice>
+    <mc:Fallback xmlns="">
+      <p:transition spd="med">
+        <p:fade/>
+      </p:transition>
+    </mc:Fallback>
+  </mc:AlternateContent>
+  <p:timing>
+    <p:tnLst>
+      <p:par>
+        <p:cTn id="1" dur="indefinite" restart="never" nodeType="tmRoot"/>
+      </p:par>
+    </p:tnLst>
+  </p:timing>
+</p:sld>
+</file>
+
+<file path=ppt/slides/slide16.xml><?xml version="1.0" encoding="utf-8"?>
+<p:sld xmlns:a="http://schemas.openxmlformats.org/drawingml/2006/main" xmlns:r="http://schemas.openxmlformats.org/officeDocument/2006/relationships" xmlns:p="http://schemas.openxmlformats.org/presentationml/2006/main">
+  <p:cSld>
+    <p:spTree>
+      <p:nvGrpSpPr>
+        <p:cNvPr id="1" name=""/>
+        <p:cNvGrpSpPr/>
+        <p:nvPr/>
+      </p:nvGrpSpPr>
+      <p:grpSpPr>
+        <a:xfrm>
+          <a:off x="0" y="0"/>
+          <a:ext cx="0" cy="0"/>
+          <a:chOff x="0" y="0"/>
+          <a:chExt cx="0" cy="0"/>
+        </a:xfrm>
+      </p:grpSpPr>
+      <p:sp>
+        <p:nvSpPr>
+          <p:cNvPr id="10" name="Afrundet rektangel 9"/>
+          <p:cNvSpPr/>
+          <p:nvPr/>
+        </p:nvSpPr>
+        <p:spPr>
+          <a:xfrm>
+            <a:off x="1124953" y="210552"/>
+            <a:ext cx="2045368" cy="1395663"/>
+          </a:xfrm>
+          <a:prstGeom prst="roundRect">
+            <a:avLst/>
+          </a:prstGeom>
+        </p:spPr>
+        <p:style>
+          <a:lnRef idx="2">
+            <a:schemeClr val="accent1">
+              <a:shade val="50000"/>
+            </a:schemeClr>
+          </a:lnRef>
+          <a:fillRef idx="1">
+            <a:schemeClr val="accent1"/>
+          </a:fillRef>
+          <a:effectRef idx="0">
+            <a:schemeClr val="accent1"/>
+          </a:effectRef>
+          <a:fontRef idx="minor">
+            <a:schemeClr val="lt1"/>
+          </a:fontRef>
+        </p:style>
+        <p:txBody>
+          <a:bodyPr rtlCol="0" anchor="ctr"/>
+          <a:lstStyle/>
+          <a:p>
+            <a:pPr algn="ctr"/>
+            <a:r>
+              <a:rPr lang="da-DK" sz="3600" smtClean="0"/>
+              <a:t>App</a:t>
+            </a:r>
+          </a:p>
+          <a:p>
+            <a:pPr algn="ctr"/>
+            <a:r>
+              <a:rPr lang="da-DK" sz="2400" smtClean="0"/>
+              <a:t>(UWP)</a:t>
+            </a:r>
+            <a:endParaRPr lang="da-DK" sz="2400"/>
+          </a:p>
+        </p:txBody>
+      </p:sp>
+      <p:sp>
+        <p:nvSpPr>
+          <p:cNvPr id="9" name="Afrundet rektangel 8"/>
+          <p:cNvSpPr/>
+          <p:nvPr/>
+        </p:nvSpPr>
+        <p:spPr>
+          <a:xfrm>
+            <a:off x="6346658" y="134352"/>
+            <a:ext cx="5528509" cy="6519111"/>
+          </a:xfrm>
+          <a:prstGeom prst="roundRect">
+            <a:avLst/>
+          </a:prstGeom>
+          <a:solidFill>
+            <a:schemeClr val="bg1">
+              <a:lumMod val="50000"/>
+            </a:schemeClr>
+          </a:solidFill>
+          <a:ln>
+            <a:solidFill>
+              <a:schemeClr val="bg1">
+                <a:lumMod val="50000"/>
+              </a:schemeClr>
+            </a:solidFill>
+          </a:ln>
+        </p:spPr>
+        <p:style>
+          <a:lnRef idx="2">
+            <a:schemeClr val="accent1">
+              <a:shade val="50000"/>
+            </a:schemeClr>
+          </a:lnRef>
+          <a:fillRef idx="1">
+            <a:schemeClr val="accent1"/>
+          </a:fillRef>
+          <a:effectRef idx="0">
+            <a:schemeClr val="accent1"/>
+          </a:effectRef>
+          <a:fontRef idx="minor">
+            <a:schemeClr val="lt1"/>
+          </a:fontRef>
+        </p:style>
+        <p:txBody>
+          <a:bodyPr rtlCol="0" anchor="ctr"/>
+          <a:lstStyle/>
+          <a:p>
+            <a:r>
+              <a:rPr lang="da-DK" sz="3200" smtClean="0">
+                <a:solidFill>
+                  <a:srgbClr val="FFFF00"/>
+                </a:solidFill>
+              </a:rPr>
+              <a:t>Azure</a:t>
+            </a:r>
+            <a:endParaRPr lang="da-DK" sz="3200">
+              <a:solidFill>
+                <a:srgbClr val="FFFF00"/>
+              </a:solidFill>
+            </a:endParaRPr>
+          </a:p>
+        </p:txBody>
+      </p:sp>
+      <p:sp>
+        <p:nvSpPr>
+          <p:cNvPr id="5" name="Afrundet rektangel 4"/>
+          <p:cNvSpPr/>
+          <p:nvPr/>
+        </p:nvSpPr>
+        <p:spPr>
+          <a:xfrm>
+            <a:off x="8079204" y="210551"/>
+            <a:ext cx="3031958" cy="1395663"/>
+          </a:xfrm>
+          <a:prstGeom prst="roundRect">
+            <a:avLst/>
+          </a:prstGeom>
+          <a:solidFill>
+            <a:srgbClr val="C00000"/>
+          </a:solidFill>
+        </p:spPr>
+        <p:style>
+          <a:lnRef idx="2">
+            <a:schemeClr val="accent1">
+              <a:shade val="50000"/>
+            </a:schemeClr>
+          </a:lnRef>
+          <a:fillRef idx="1">
+            <a:schemeClr val="accent1"/>
+          </a:fillRef>
+          <a:effectRef idx="0">
+            <a:schemeClr val="accent1"/>
+          </a:effectRef>
+          <a:fontRef idx="minor">
+            <a:schemeClr val="lt1"/>
+          </a:fontRef>
+        </p:style>
+        <p:txBody>
+          <a:bodyPr rtlCol="0" anchor="ctr"/>
+          <a:lstStyle/>
+          <a:p>
+            <a:pPr algn="ctr"/>
+            <a:r>
+              <a:rPr lang="da-DK" sz="3600" smtClean="0"/>
+              <a:t>Web Service</a:t>
+            </a:r>
+          </a:p>
+        </p:txBody>
+      </p:sp>
+      <p:sp>
+        <p:nvSpPr>
+          <p:cNvPr id="2" name="Magnetpladelager 1"/>
+          <p:cNvSpPr/>
+          <p:nvPr/>
+        </p:nvSpPr>
+        <p:spPr>
+          <a:xfrm>
+            <a:off x="8079204" y="4855745"/>
+            <a:ext cx="3031958" cy="1617245"/>
+          </a:xfrm>
+          <a:prstGeom prst="flowChartMagneticDisk">
+            <a:avLst/>
+          </a:prstGeom>
+          <a:solidFill>
+            <a:schemeClr val="accent6">
+              <a:lumMod val="75000"/>
+            </a:schemeClr>
+          </a:solidFill>
+        </p:spPr>
+        <p:style>
+          <a:lnRef idx="2">
+            <a:schemeClr val="accent1">
+              <a:shade val="50000"/>
+            </a:schemeClr>
+          </a:lnRef>
+          <a:fillRef idx="1">
+            <a:schemeClr val="accent1"/>
+          </a:fillRef>
+          <a:effectRef idx="0">
+            <a:schemeClr val="accent1"/>
+          </a:effectRef>
+          <a:fontRef idx="minor">
+            <a:schemeClr val="lt1"/>
+          </a:fontRef>
+        </p:style>
+        <p:txBody>
+          <a:bodyPr rtlCol="0" anchor="ctr"/>
+          <a:lstStyle/>
+          <a:p>
+            <a:pPr algn="ctr"/>
+            <a:r>
+              <a:rPr lang="da-DK" sz="3600" smtClean="0"/>
+              <a:t>Database</a:t>
+            </a:r>
+            <a:endParaRPr lang="da-DK" sz="3600"/>
+          </a:p>
+        </p:txBody>
+      </p:sp>
+      <p:sp>
+        <p:nvSpPr>
+          <p:cNvPr id="11" name="Afrundet rektangel 10"/>
+          <p:cNvSpPr/>
+          <p:nvPr/>
+        </p:nvSpPr>
+        <p:spPr>
+          <a:xfrm>
+            <a:off x="8079204" y="2594806"/>
+            <a:ext cx="3031958" cy="1395663"/>
+          </a:xfrm>
+          <a:prstGeom prst="roundRect">
+            <a:avLst/>
+          </a:prstGeom>
+          <a:solidFill>
+            <a:schemeClr val="accent5">
+              <a:lumMod val="75000"/>
+            </a:schemeClr>
+          </a:solidFill>
+        </p:spPr>
+        <p:style>
+          <a:lnRef idx="2">
+            <a:schemeClr val="accent1">
+              <a:shade val="50000"/>
+            </a:schemeClr>
+          </a:lnRef>
+          <a:fillRef idx="1">
+            <a:schemeClr val="accent1"/>
+          </a:fillRef>
+          <a:effectRef idx="0">
+            <a:schemeClr val="accent1"/>
+          </a:effectRef>
+          <a:fontRef idx="minor">
+            <a:schemeClr val="lt1"/>
+          </a:fontRef>
+        </p:style>
+        <p:txBody>
+          <a:bodyPr rtlCol="0" anchor="ctr"/>
+          <a:lstStyle/>
+          <a:p>
+            <a:pPr algn="ctr"/>
+            <a:r>
+              <a:rPr lang="da-DK" sz="3600" smtClean="0"/>
+              <a:t>Entity Framework</a:t>
+            </a:r>
+          </a:p>
+        </p:txBody>
+      </p:sp>
+      <p:sp>
+        <p:nvSpPr>
+          <p:cNvPr id="12" name="Opad-nedadgående pil 11"/>
+          <p:cNvSpPr/>
+          <p:nvPr/>
+        </p:nvSpPr>
+        <p:spPr>
+          <a:xfrm>
+            <a:off x="9228220" y="3830048"/>
+            <a:ext cx="733926" cy="1371603"/>
+          </a:xfrm>
+          <a:prstGeom prst="upDownArrow">
+            <a:avLst/>
+          </a:prstGeom>
+          <a:solidFill>
+            <a:schemeClr val="tx1">
+              <a:lumMod val="65000"/>
+              <a:lumOff val="35000"/>
+            </a:schemeClr>
+          </a:solidFill>
+        </p:spPr>
+        <p:style>
+          <a:lnRef idx="2">
+            <a:schemeClr val="accent1">
+              <a:shade val="50000"/>
+            </a:schemeClr>
+          </a:lnRef>
+          <a:fillRef idx="1">
+            <a:schemeClr val="accent1"/>
+          </a:fillRef>
+          <a:effectRef idx="0">
+            <a:schemeClr val="accent1"/>
+          </a:effectRef>
+          <a:fontRef idx="minor">
+            <a:schemeClr val="lt1"/>
+          </a:fontRef>
+        </p:style>
+        <p:txBody>
+          <a:bodyPr rtlCol="0" anchor="ctr"/>
+          <a:lstStyle/>
+          <a:p>
+            <a:pPr algn="ctr"/>
+            <a:endParaRPr lang="da-DK"/>
+          </a:p>
+        </p:txBody>
+      </p:sp>
+      <p:sp>
+        <p:nvSpPr>
+          <p:cNvPr id="15" name="Opad-nedadgående pil 14"/>
+          <p:cNvSpPr/>
+          <p:nvPr/>
+        </p:nvSpPr>
+        <p:spPr>
+          <a:xfrm>
+            <a:off x="9228220" y="1414709"/>
+            <a:ext cx="733926" cy="1371603"/>
+          </a:xfrm>
+          <a:prstGeom prst="upDownArrow">
+            <a:avLst/>
+          </a:prstGeom>
+          <a:solidFill>
+            <a:schemeClr val="tx1">
+              <a:lumMod val="65000"/>
+              <a:lumOff val="35000"/>
+            </a:schemeClr>
+          </a:solidFill>
+        </p:spPr>
+        <p:style>
+          <a:lnRef idx="2">
+            <a:schemeClr val="accent1">
+              <a:shade val="50000"/>
+            </a:schemeClr>
+          </a:lnRef>
+          <a:fillRef idx="1">
+            <a:schemeClr val="accent1"/>
+          </a:fillRef>
+          <a:effectRef idx="0">
+            <a:schemeClr val="accent1"/>
+          </a:effectRef>
+          <a:fontRef idx="minor">
+            <a:schemeClr val="lt1"/>
+          </a:fontRef>
+        </p:style>
+        <p:txBody>
+          <a:bodyPr rtlCol="0" anchor="ctr"/>
+          <a:lstStyle/>
+          <a:p>
+            <a:pPr algn="ctr"/>
+            <a:endParaRPr lang="da-DK"/>
+          </a:p>
+        </p:txBody>
+      </p:sp>
+      <p:sp>
+        <p:nvSpPr>
+          <p:cNvPr id="6" name="Højre-venstrepil 5"/>
+          <p:cNvSpPr/>
+          <p:nvPr/>
+        </p:nvSpPr>
+        <p:spPr>
+          <a:xfrm>
+            <a:off x="3001879" y="475245"/>
+            <a:ext cx="5263816" cy="866274"/>
+          </a:xfrm>
+          <a:prstGeom prst="leftRightArrow">
+            <a:avLst/>
+          </a:prstGeom>
+          <a:solidFill>
+            <a:schemeClr val="tx1">
+              <a:lumMod val="65000"/>
+              <a:lumOff val="35000"/>
+            </a:schemeClr>
+          </a:solidFill>
+        </p:spPr>
+        <p:style>
+          <a:lnRef idx="2">
+            <a:schemeClr val="accent1">
+              <a:shade val="50000"/>
+            </a:schemeClr>
+          </a:lnRef>
+          <a:fillRef idx="1">
+            <a:schemeClr val="accent1"/>
+          </a:fillRef>
+          <a:effectRef idx="0">
+            <a:schemeClr val="accent1"/>
+          </a:effectRef>
+          <a:fontRef idx="minor">
+            <a:schemeClr val="lt1"/>
+          </a:fontRef>
+        </p:style>
+        <p:txBody>
+          <a:bodyPr rtlCol="0" anchor="ctr"/>
+          <a:lstStyle/>
+          <a:p>
+            <a:pPr algn="ctr"/>
+            <a:r>
+              <a:rPr lang="da-DK" smtClean="0"/>
+              <a:t>HTTP Request/Response</a:t>
+            </a:r>
+            <a:endParaRPr lang="da-DK"/>
+          </a:p>
+        </p:txBody>
+      </p:sp>
+      <p:sp>
+        <p:nvSpPr>
+          <p:cNvPr id="13" name="Titel 1"/>
+          <p:cNvSpPr txBox="1">
+            <a:spLocks/>
+          </p:cNvSpPr>
+          <p:nvPr/>
+        </p:nvSpPr>
+        <p:spPr>
+          <a:xfrm>
+            <a:off x="1524001" y="3459079"/>
+            <a:ext cx="2813384" cy="808120"/>
+          </a:xfrm>
+          <a:prstGeom prst="rect">
+            <a:avLst/>
+          </a:prstGeom>
+        </p:spPr>
+        <p:txBody>
+          <a:bodyPr vert="horz" lIns="91440" tIns="45720" rIns="91440" bIns="45720" rtlCol="0" anchor="ctr">
+            <a:noAutofit/>
+          </a:bodyPr>
+          <a:lstStyle>
+            <a:lvl1pPr algn="l" defTabSz="914400" rtl="0" eaLnBrk="1" latinLnBrk="0" hangingPunct="1">
+              <a:lnSpc>
+                <a:spcPct val="90000"/>
+              </a:lnSpc>
+              <a:spcBef>
+                <a:spcPct val="0"/>
+              </a:spcBef>
+              <a:buNone/>
+              <a:defRPr sz="4400" kern="1200">
+                <a:solidFill>
+                  <a:schemeClr val="tx1"/>
+                </a:solidFill>
+                <a:latin typeface="+mj-lt"/>
+                <a:ea typeface="+mj-ea"/>
+                <a:cs typeface="+mj-cs"/>
+              </a:defRPr>
+            </a:lvl1pPr>
+          </a:lstStyle>
+          <a:p>
+            <a:r>
+              <a:rPr lang="da-DK" sz="4800" b="1" smtClean="0"/>
+              <a:t>Stage 4</a:t>
+            </a:r>
+            <a:endParaRPr lang="da-DK" sz="4800" b="1"/>
+          </a:p>
+        </p:txBody>
+      </p:sp>
+    </p:spTree>
+    <p:extLst>
+      <p:ext uri="{BB962C8B-B14F-4D97-AF65-F5344CB8AC3E}">
+        <p14:creationId xmlns:p14="http://schemas.microsoft.com/office/powerpoint/2010/main" val="1136419226"/>
       </p:ext>
     </p:extLst>
   </p:cSld>
@@ -4071,11 +5845,11 @@
   <p:clrMapOvr>
     <a:masterClrMapping/>
   </p:clrMapOvr>
-  <mc:AlternateContent xmlns:mc="http://schemas.openxmlformats.org/markup-compatibility/2006">
-    <mc:Choice xmlns:p14="http://schemas.microsoft.com/office/powerpoint/2010/main" Requires="p14">
+  <mc:AlternateContent xmlns:mc="http://schemas.openxmlformats.org/markup-compatibility/2006" xmlns:p14="http://schemas.microsoft.com/office/powerpoint/2010/main">
+    <mc:Choice Requires="p14">
       <p:transition p14:dur="0"/>
     </mc:Choice>
-    <mc:Fallback>
+    <mc:Fallback xmlns="">
       <p:transition/>
     </mc:Fallback>
   </mc:AlternateContent>

</xml_diff>